<commit_message>
Adding Day 8 powerpoint, code examples and updated code files for Day 5 and Day 7
</commit_message>
<xml_diff>
--- a/powerpoints/Roc_Day5.pptx
+++ b/powerpoints/Roc_Day5.pptx
@@ -5,7 +5,7 @@
     <p:sldMasterId id="2147483661" r:id="rId1"/>
   </p:sldMasterIdLst>
   <p:notesMasterIdLst>
-    <p:notesMasterId r:id="rId38"/>
+    <p:notesMasterId r:id="rId39"/>
   </p:notesMasterIdLst>
   <p:sldIdLst>
     <p:sldId id="256" r:id="rId2"/>
@@ -38,12 +38,13 @@
     <p:sldId id="295" r:id="rId29"/>
     <p:sldId id="291" r:id="rId30"/>
     <p:sldId id="292" r:id="rId31"/>
-    <p:sldId id="267" r:id="rId32"/>
-    <p:sldId id="268" r:id="rId33"/>
-    <p:sldId id="269" r:id="rId34"/>
-    <p:sldId id="293" r:id="rId35"/>
-    <p:sldId id="271" r:id="rId36"/>
-    <p:sldId id="270" r:id="rId37"/>
+    <p:sldId id="296" r:id="rId32"/>
+    <p:sldId id="267" r:id="rId33"/>
+    <p:sldId id="268" r:id="rId34"/>
+    <p:sldId id="269" r:id="rId35"/>
+    <p:sldId id="293" r:id="rId36"/>
+    <p:sldId id="271" r:id="rId37"/>
+    <p:sldId id="270" r:id="rId38"/>
   </p:sldIdLst>
   <p:sldSz cx="9144000" cy="6858000" type="screen4x3"/>
   <p:notesSz cx="7010400" cy="9296400"/>
@@ -31059,7 +31060,15 @@
             </a:pPr>
             <a:r>
               <a:rPr lang="en-US" dirty="0"/>
-              <a:t>Some of these static methods are:</a:t>
+              <a:t>Some of these static methods </a:t>
+            </a:r>
+            <a:r>
+              <a:rPr lang="en-US" dirty="0" err="1"/>
+              <a:t>inlcude</a:t>
+            </a:r>
+            <a:r>
+              <a:rPr lang="en-US" dirty="0"/>
+              <a:t>:</a:t>
             </a:r>
           </a:p>
           <a:p>
@@ -31322,7 +31331,7 @@
             </a:pPr>
             <a:r>
               <a:rPr lang="en-US" dirty="0"/>
-              <a:t>Arrays is a utility class that can be used on arrays, such as sorting, index, </a:t>
+              <a:t>Arrays is a utility class that can be used on array objects, such as sorting, index, </a:t>
             </a:r>
             <a:r>
               <a:rPr lang="en-US" dirty="0" err="1"/>
@@ -31346,7 +31355,7 @@
             </a:pPr>
             <a:r>
               <a:rPr lang="en-US" dirty="0"/>
-              <a:t>Some of these static methods:</a:t>
+              <a:t>Some of these static methods include:</a:t>
             </a:r>
           </a:p>
           <a:p>
@@ -37026,7 +37035,7 @@
           <a:p>
             <a:r>
               <a:rPr lang="en-US" dirty="0"/>
-              <a:t>Example</a:t>
+              <a:t>Example – Creating Custom Exceptions</a:t>
             </a:r>
           </a:p>
         </p:txBody>
@@ -37083,7 +37092,7 @@
         </p:nvSpPr>
         <p:spPr>
           <a:xfrm>
-            <a:off x="1371600" y="1214611"/>
+            <a:off x="1371600" y="3744427"/>
             <a:ext cx="6400800" cy="1400832"/>
           </a:xfrm>
           <a:prstGeom prst="rect">
@@ -37171,6 +37180,170 @@
       </p:sp>
       <p:sp>
         <p:nvSpPr>
+          <p:cNvPr id="7" name="Google Shape;289;p26">
+            <a:extLst>
+              <a:ext uri="{FF2B5EF4-FFF2-40B4-BE49-F238E27FC236}">
+                <a16:creationId xmlns:a16="http://schemas.microsoft.com/office/drawing/2014/main" id="{86C86923-55C9-449C-B31B-0365EE323A76}"/>
+              </a:ext>
+            </a:extLst>
+          </p:cNvPr>
+          <p:cNvSpPr txBox="1">
+            <a:spLocks noGrp="1"/>
+          </p:cNvSpPr>
+          <p:nvPr>
+            <p:ph type="body" idx="1"/>
+          </p:nvPr>
+        </p:nvSpPr>
+        <p:spPr>
+          <a:xfrm>
+            <a:off x="380010" y="1481446"/>
+            <a:ext cx="8383980" cy="4525963"/>
+          </a:xfrm>
+          <a:prstGeom prst="rect">
+            <a:avLst/>
+          </a:prstGeom>
+          <a:noFill/>
+          <a:ln>
+            <a:noFill/>
+          </a:ln>
+        </p:spPr>
+        <p:txBody>
+          <a:bodyPr spcFirstLastPara="1" wrap="square" lIns="91425" tIns="45700" rIns="91425" bIns="45700" anchor="t" anchorCtr="0">
+            <a:normAutofit/>
+          </a:bodyPr>
+          <a:lstStyle/>
+          <a:p>
+            <a:pPr marL="342900" lvl="0" indent="-342900" algn="l" rtl="0">
+              <a:spcBef>
+                <a:spcPts val="0"/>
+              </a:spcBef>
+              <a:spcAft>
+                <a:spcPts val="0"/>
+              </a:spcAft>
+              <a:buSzPts val="2590"/>
+              <a:buChar char="•"/>
+            </a:pPr>
+            <a:r>
+              <a:rPr lang="en-US" sz="2590" dirty="0"/>
+              <a:t>Custom Exception can be created by extending the Exception Class, or the Throwable Class.</a:t>
+            </a:r>
+          </a:p>
+          <a:p>
+            <a:pPr marL="342900" lvl="0" indent="-342900" algn="l" rtl="0">
+              <a:spcBef>
+                <a:spcPts val="0"/>
+              </a:spcBef>
+              <a:spcAft>
+                <a:spcPts val="0"/>
+              </a:spcAft>
+              <a:buSzPts val="2590"/>
+              <a:buChar char="•"/>
+            </a:pPr>
+            <a:r>
+              <a:rPr lang="en-US" sz="2590" dirty="0"/>
+              <a:t>Typically, this is done by extending the Exception class to provide more structure to the newly created exception.</a:t>
+            </a:r>
+          </a:p>
+        </p:txBody>
+      </p:sp>
+    </p:spTree>
+    <p:extLst>
+      <p:ext uri="{BB962C8B-B14F-4D97-AF65-F5344CB8AC3E}">
+        <p14:creationId xmlns:p14="http://schemas.microsoft.com/office/powerpoint/2010/main" val="95856629"/>
+      </p:ext>
+    </p:extLst>
+  </p:cSld>
+  <p:clrMapOvr>
+    <a:masterClrMapping/>
+  </p:clrMapOvr>
+</p:sld>
+</file>
+
+<file path=ppt/slides/slide31.xml><?xml version="1.0" encoding="utf-8"?>
+<p:sld xmlns:a="http://schemas.openxmlformats.org/drawingml/2006/main" xmlns:r="http://schemas.openxmlformats.org/officeDocument/2006/relationships" xmlns:p="http://schemas.openxmlformats.org/presentationml/2006/main">
+  <p:cSld>
+    <p:spTree>
+      <p:nvGrpSpPr>
+        <p:cNvPr id="1" name=""/>
+        <p:cNvGrpSpPr/>
+        <p:nvPr/>
+      </p:nvGrpSpPr>
+      <p:grpSpPr>
+        <a:xfrm>
+          <a:off x="0" y="0"/>
+          <a:ext cx="0" cy="0"/>
+          <a:chOff x="0" y="0"/>
+          <a:chExt cx="0" cy="0"/>
+        </a:xfrm>
+      </p:grpSpPr>
+      <p:sp>
+        <p:nvSpPr>
+          <p:cNvPr id="2" name="Title 1">
+            <a:extLst>
+              <a:ext uri="{FF2B5EF4-FFF2-40B4-BE49-F238E27FC236}">
+                <a16:creationId xmlns:a16="http://schemas.microsoft.com/office/drawing/2014/main" id="{4EE113FE-6CF5-4DCF-B5BC-7066A80B7A17}"/>
+              </a:ext>
+            </a:extLst>
+          </p:cNvPr>
+          <p:cNvSpPr>
+            <a:spLocks noGrp="1"/>
+          </p:cNvSpPr>
+          <p:nvPr>
+            <p:ph type="title"/>
+          </p:nvPr>
+        </p:nvSpPr>
+        <p:spPr/>
+        <p:txBody>
+          <a:bodyPr/>
+          <a:lstStyle/>
+          <a:p>
+            <a:r>
+              <a:rPr lang="en-US" dirty="0"/>
+              <a:t>Example – Using Custom Exceptions</a:t>
+            </a:r>
+          </a:p>
+        </p:txBody>
+      </p:sp>
+      <p:sp>
+        <p:nvSpPr>
+          <p:cNvPr id="4" name="Slide Number Placeholder 3">
+            <a:extLst>
+              <a:ext uri="{FF2B5EF4-FFF2-40B4-BE49-F238E27FC236}">
+                <a16:creationId xmlns:a16="http://schemas.microsoft.com/office/drawing/2014/main" id="{EDA35003-1376-4D22-96BB-2BF52AF1DA27}"/>
+              </a:ext>
+            </a:extLst>
+          </p:cNvPr>
+          <p:cNvSpPr>
+            <a:spLocks noGrp="1"/>
+          </p:cNvSpPr>
+          <p:nvPr>
+            <p:ph type="sldNum" idx="12"/>
+          </p:nvPr>
+        </p:nvSpPr>
+        <p:spPr/>
+        <p:txBody>
+          <a:bodyPr/>
+          <a:lstStyle/>
+          <a:p>
+            <a:pPr marL="0" lvl="0" indent="0" algn="r" rtl="0">
+              <a:spcBef>
+                <a:spcPts val="0"/>
+              </a:spcBef>
+              <a:spcAft>
+                <a:spcPts val="0"/>
+              </a:spcAft>
+              <a:buNone/>
+            </a:pPr>
+            <a:fld id="{00000000-1234-1234-1234-123412341234}" type="slidenum">
+              <a:rPr lang="en-US" smtClean="0"/>
+              <a:t>30</a:t>
+            </a:fld>
+            <a:endParaRPr lang="en-US"/>
+          </a:p>
+        </p:txBody>
+      </p:sp>
+      <p:sp>
+        <p:nvSpPr>
           <p:cNvPr id="6" name="Rectangle 5">
             <a:extLst>
               <a:ext uri="{FF2B5EF4-FFF2-40B4-BE49-F238E27FC236}">
@@ -37183,8 +37356,8 @@
         </p:nvSpPr>
         <p:spPr>
           <a:xfrm>
-            <a:off x="159572" y="2795411"/>
-            <a:ext cx="8824172" cy="3667399"/>
+            <a:off x="159914" y="1921080"/>
+            <a:ext cx="8824172" cy="4088726"/>
           </a:xfrm>
           <a:prstGeom prst="rect">
             <a:avLst/>
@@ -37435,7 +37608,7 @@
     </p:spTree>
     <p:extLst>
       <p:ext uri="{BB962C8B-B14F-4D97-AF65-F5344CB8AC3E}">
-        <p14:creationId xmlns:p14="http://schemas.microsoft.com/office/powerpoint/2010/main" val="95856629"/>
+        <p14:creationId xmlns:p14="http://schemas.microsoft.com/office/powerpoint/2010/main" val="3737166922"/>
       </p:ext>
     </p:extLst>
   </p:cSld>
@@ -37445,7 +37618,7 @@
 </p:sld>
 </file>
 
-<file path=ppt/slides/slide31.xml><?xml version="1.0" encoding="utf-8"?>
+<file path=ppt/slides/slide32.xml><?xml version="1.0" encoding="utf-8"?>
 <p:sld xmlns:a="http://schemas.openxmlformats.org/drawingml/2006/main" xmlns:r="http://schemas.openxmlformats.org/officeDocument/2006/relationships" xmlns:p="http://schemas.openxmlformats.org/presentationml/2006/main">
   <p:cSld>
     <p:spTree>
@@ -37692,7 +37865,7 @@
             </a:pPr>
             <a:fld id="{00000000-1234-1234-1234-123412341234}" type="slidenum">
               <a:rPr lang="en-US"/>
-              <a:t>30</a:t>
+              <a:t>31</a:t>
             </a:fld>
             <a:endParaRPr/>
           </a:p>
@@ -37706,7 +37879,7 @@
 </p:sld>
 </file>
 
-<file path=ppt/slides/slide32.xml><?xml version="1.0" encoding="utf-8"?>
+<file path=ppt/slides/slide33.xml><?xml version="1.0" encoding="utf-8"?>
 <p:sld xmlns:a="http://schemas.openxmlformats.org/drawingml/2006/main" xmlns:r="http://schemas.openxmlformats.org/officeDocument/2006/relationships" xmlns:p="http://schemas.openxmlformats.org/presentationml/2006/main">
   <p:cSld>
     <p:spTree>
@@ -38187,7 +38360,7 @@
             </a:pPr>
             <a:fld id="{00000000-1234-1234-1234-123412341234}" type="slidenum">
               <a:rPr lang="en-US"/>
-              <a:t>31</a:t>
+              <a:t>32</a:t>
             </a:fld>
             <a:endParaRPr/>
           </a:p>
@@ -38389,7 +38562,7 @@
 </p:sld>
 </file>
 
-<file path=ppt/slides/slide33.xml><?xml version="1.0" encoding="utf-8"?>
+<file path=ppt/slides/slide34.xml><?xml version="1.0" encoding="utf-8"?>
 <p:sld xmlns:a="http://schemas.openxmlformats.org/drawingml/2006/main" xmlns:r="http://schemas.openxmlformats.org/officeDocument/2006/relationships" xmlns:p="http://schemas.openxmlformats.org/presentationml/2006/main">
   <p:cSld>
     <p:spTree>
@@ -38898,7 +39071,7 @@
             </a:pPr>
             <a:fld id="{00000000-1234-1234-1234-123412341234}" type="slidenum">
               <a:rPr lang="en-US"/>
-              <a:t>32</a:t>
+              <a:t>33</a:t>
             </a:fld>
             <a:endParaRPr/>
           </a:p>
@@ -38912,7 +39085,7 @@
 </p:sld>
 </file>
 
-<file path=ppt/slides/slide34.xml><?xml version="1.0" encoding="utf-8"?>
+<file path=ppt/slides/slide35.xml><?xml version="1.0" encoding="utf-8"?>
 <p:sld xmlns:a="http://schemas.openxmlformats.org/drawingml/2006/main" xmlns:r="http://schemas.openxmlformats.org/officeDocument/2006/relationships" xmlns:p="http://schemas.openxmlformats.org/presentationml/2006/main">
   <p:cSld>
     <p:spTree>
@@ -39118,7 +39291,7 @@
             </a:pPr>
             <a:fld id="{00000000-1234-1234-1234-123412341234}" type="slidenum">
               <a:rPr lang="en-US"/>
-              <a:t>33</a:t>
+              <a:t>34</a:t>
             </a:fld>
             <a:endParaRPr/>
           </a:p>
@@ -39132,7 +39305,7 @@
 </p:sld>
 </file>
 
-<file path=ppt/slides/slide35.xml><?xml version="1.0" encoding="utf-8"?>
+<file path=ppt/slides/slide36.xml><?xml version="1.0" encoding="utf-8"?>
 <p:sld xmlns:a="http://schemas.openxmlformats.org/drawingml/2006/main" xmlns:r="http://schemas.openxmlformats.org/officeDocument/2006/relationships" xmlns:p="http://schemas.openxmlformats.org/presentationml/2006/main">
   <p:cSld>
     <p:spTree>
@@ -39381,7 +39554,7 @@
             </a:pPr>
             <a:fld id="{00000000-1234-1234-1234-123412341234}" type="slidenum">
               <a:rPr lang="en-US"/>
-              <a:t>34</a:t>
+              <a:t>35</a:t>
             </a:fld>
             <a:endParaRPr/>
           </a:p>
@@ -39395,7 +39568,7 @@
 </p:sld>
 </file>
 
-<file path=ppt/slides/slide36.xml><?xml version="1.0" encoding="utf-8"?>
+<file path=ppt/slides/slide37.xml><?xml version="1.0" encoding="utf-8"?>
 <p:sld xmlns:a="http://schemas.openxmlformats.org/drawingml/2006/main" xmlns:r="http://schemas.openxmlformats.org/officeDocument/2006/relationships" xmlns:p="http://schemas.openxmlformats.org/presentationml/2006/main">
   <p:cSld>
     <p:spTree>
@@ -39499,7 +39672,7 @@
             </a:pPr>
             <a:fld id="{00000000-1234-1234-1234-123412341234}" type="slidenum">
               <a:rPr lang="en-US"/>
-              <a:t>35</a:t>
+              <a:t>36</a:t>
             </a:fld>
             <a:endParaRPr/>
           </a:p>
@@ -40628,7 +40801,7 @@
                 <a:latin typeface="Courier New" panose="02070309020205020404" pitchFamily="49" charset="0"/>
                 <a:cs typeface="Courier New" panose="02070309020205020404" pitchFamily="49" charset="0"/>
               </a:rPr>
-              <a:t>	int[] stack = new int[5]; </a:t>
+              <a:t>	private int[] stack = new int[5]; </a:t>
             </a:r>
           </a:p>
           <a:p>
@@ -40643,7 +40816,7 @@
                 <a:latin typeface="Courier New" panose="02070309020205020404" pitchFamily="49" charset="0"/>
                 <a:cs typeface="Courier New" panose="02070309020205020404" pitchFamily="49" charset="0"/>
               </a:rPr>
-              <a:t>	int </a:t>
+              <a:t>	private int </a:t>
             </a:r>
             <a:r>
               <a:rPr lang="en-US" sz="1100" dirty="0" err="1">
@@ -41065,7 +41238,7 @@
                 <a:latin typeface="Courier New" panose="02070309020205020404" pitchFamily="49" charset="0"/>
                 <a:cs typeface="Courier New" panose="02070309020205020404" pitchFamily="49" charset="0"/>
               </a:rPr>
-              <a:t>]; 		</a:t>
+              <a:t>]; </a:t>
             </a:r>
           </a:p>
           <a:p>

</xml_diff>